<commit_message>
update slide bài 14 - 15
</commit_message>
<xml_diff>
--- a/14-15. Đèn thông minh/Đèn thông minh phần 1 Tạo một thiết bị kết nối với AWS IOT core.pptx
+++ b/14-15. Đèn thông minh/Đèn thông minh phần 1 Tạo một thiết bị kết nối với AWS IOT core.pptx
@@ -138,8 +138,8 @@
   </pc:docChgLst>
   <pc:docChgLst>
     <pc:chgData name="Huong Nguyen" userId="a3438fb82b5343a2" providerId="LiveId" clId="{F83FA522-6960-4F44-B8AD-BF6FA669975D}"/>
-    <pc:docChg chg="modSld">
-      <pc:chgData name="Huong Nguyen" userId="a3438fb82b5343a2" providerId="LiveId" clId="{F83FA522-6960-4F44-B8AD-BF6FA669975D}" dt="2018-09-18T16:56:57.385" v="112"/>
+    <pc:docChg chg="undo custSel modSld">
+      <pc:chgData name="Huong Nguyen" userId="a3438fb82b5343a2" providerId="LiveId" clId="{F83FA522-6960-4F44-B8AD-BF6FA669975D}" dt="2018-09-29T06:58:55.248" v="472" actId="1582"/>
       <pc:docMkLst>
         <pc:docMk/>
       </pc:docMkLst>
@@ -158,12 +158,298 @@
           </ac:spMkLst>
         </pc:spChg>
       </pc:sldChg>
-      <pc:sldChg chg="delCm">
-        <pc:chgData name="Huong Nguyen" userId="a3438fb82b5343a2" providerId="LiveId" clId="{F83FA522-6960-4F44-B8AD-BF6FA669975D}" dt="2018-09-18T16:56:57.385" v="112"/>
+      <pc:sldChg chg="addSp modSp">
+        <pc:chgData name="Huong Nguyen" userId="a3438fb82b5343a2" providerId="LiveId" clId="{F83FA522-6960-4F44-B8AD-BF6FA669975D}" dt="2018-09-29T06:58:55.248" v="472" actId="1582"/>
+        <pc:sldMkLst>
+          <pc:docMk/>
+          <pc:sldMk cId="1878864271" sldId="306"/>
+        </pc:sldMkLst>
+        <pc:spChg chg="mod">
+          <ac:chgData name="Huong Nguyen" userId="a3438fb82b5343a2" providerId="LiveId" clId="{F83FA522-6960-4F44-B8AD-BF6FA669975D}" dt="2018-09-29T06:58:01.386" v="419" actId="1076"/>
+          <ac:spMkLst>
+            <pc:docMk/>
+            <pc:sldMk cId="1878864271" sldId="306"/>
+            <ac:spMk id="2" creationId="{00000000-0000-0000-0000-000000000000}"/>
+          </ac:spMkLst>
+        </pc:spChg>
+        <pc:spChg chg="add mod">
+          <ac:chgData name="Huong Nguyen" userId="a3438fb82b5343a2" providerId="LiveId" clId="{F83FA522-6960-4F44-B8AD-BF6FA669975D}" dt="2018-09-29T06:58:09.638" v="465" actId="1038"/>
+          <ac:spMkLst>
+            <pc:docMk/>
+            <pc:sldMk cId="1878864271" sldId="306"/>
+            <ac:spMk id="4" creationId="{4E687418-25DB-458D-9A61-E769E4A9557F}"/>
+          </ac:spMkLst>
+        </pc:spChg>
+        <pc:spChg chg="add mod">
+          <ac:chgData name="Huong Nguyen" userId="a3438fb82b5343a2" providerId="LiveId" clId="{F83FA522-6960-4F44-B8AD-BF6FA669975D}" dt="2018-09-29T06:58:09.638" v="465" actId="1038"/>
+          <ac:spMkLst>
+            <pc:docMk/>
+            <pc:sldMk cId="1878864271" sldId="306"/>
+            <ac:spMk id="8" creationId="{CECF9CE6-2B3F-4D3E-B9CD-27A874EA299D}"/>
+          </ac:spMkLst>
+        </pc:spChg>
+        <pc:picChg chg="mod">
+          <ac:chgData name="Huong Nguyen" userId="a3438fb82b5343a2" providerId="LiveId" clId="{F83FA522-6960-4F44-B8AD-BF6FA669975D}" dt="2018-09-29T06:58:19.746" v="467" actId="1076"/>
+          <ac:picMkLst>
+            <pc:docMk/>
+            <pc:sldMk cId="1878864271" sldId="306"/>
+            <ac:picMk id="16" creationId="{983A2F2B-5DDF-461D-A1EF-7DCEB7A9D8B2}"/>
+          </ac:picMkLst>
+        </pc:picChg>
+        <pc:picChg chg="add mod">
+          <ac:chgData name="Huong Nguyen" userId="a3438fb82b5343a2" providerId="LiveId" clId="{F83FA522-6960-4F44-B8AD-BF6FA669975D}" dt="2018-09-29T06:58:09.638" v="465" actId="1038"/>
+          <ac:picMkLst>
+            <pc:docMk/>
+            <pc:sldMk cId="1878864271" sldId="306"/>
+            <ac:picMk id="3074" creationId="{A00ABE59-CC75-434A-B72A-6C01AE944180}"/>
+          </ac:picMkLst>
+        </pc:picChg>
+        <pc:cxnChg chg="add mod">
+          <ac:chgData name="Huong Nguyen" userId="a3438fb82b5343a2" providerId="LiveId" clId="{F83FA522-6960-4F44-B8AD-BF6FA669975D}" dt="2018-09-29T06:58:55.248" v="472" actId="1582"/>
+          <ac:cxnSpMkLst>
+            <pc:docMk/>
+            <pc:sldMk cId="1878864271" sldId="306"/>
+            <ac:cxnSpMk id="5" creationId="{1B2780DB-AAEC-49F7-9BCB-947370F1D6B2}"/>
+          </ac:cxnSpMkLst>
+        </pc:cxnChg>
+        <pc:cxnChg chg="add mod">
+          <ac:chgData name="Huong Nguyen" userId="a3438fb82b5343a2" providerId="LiveId" clId="{F83FA522-6960-4F44-B8AD-BF6FA669975D}" dt="2018-09-29T06:58:48.691" v="471" actId="1582"/>
+          <ac:cxnSpMkLst>
+            <pc:docMk/>
+            <pc:sldMk cId="1878864271" sldId="306"/>
+            <ac:cxnSpMk id="9" creationId="{BBB66E13-FC62-4FC5-B15D-C3CAE305BCC2}"/>
+          </ac:cxnSpMkLst>
+        </pc:cxnChg>
+      </pc:sldChg>
+      <pc:sldChg chg="addSp delSp modSp delCm">
+        <pc:chgData name="Huong Nguyen" userId="a3438fb82b5343a2" providerId="LiveId" clId="{F83FA522-6960-4F44-B8AD-BF6FA669975D}" dt="2018-09-29T04:42:26.659" v="373" actId="20577"/>
         <pc:sldMkLst>
           <pc:docMk/>
           <pc:sldMk cId="3864306079" sldId="307"/>
         </pc:sldMkLst>
+        <pc:spChg chg="add del mod">
+          <ac:chgData name="Huong Nguyen" userId="a3438fb82b5343a2" providerId="LiveId" clId="{F83FA522-6960-4F44-B8AD-BF6FA669975D}" dt="2018-09-29T04:41:59.091" v="312" actId="20577"/>
+          <ac:spMkLst>
+            <pc:docMk/>
+            <pc:sldMk cId="3864306079" sldId="307"/>
+            <ac:spMk id="3" creationId="{28C742A5-9D53-4B67-A126-D4C191B39425}"/>
+          </ac:spMkLst>
+        </pc:spChg>
+        <pc:spChg chg="mod">
+          <ac:chgData name="Huong Nguyen" userId="a3438fb82b5343a2" providerId="LiveId" clId="{F83FA522-6960-4F44-B8AD-BF6FA669975D}" dt="2018-09-29T04:41:09.347" v="261" actId="1076"/>
+          <ac:spMkLst>
+            <pc:docMk/>
+            <pc:sldMk cId="3864306079" sldId="307"/>
+            <ac:spMk id="4" creationId="{2A08BA30-0188-435B-8B26-2C1B859390B4}"/>
+          </ac:spMkLst>
+        </pc:spChg>
+        <pc:spChg chg="add del mod">
+          <ac:chgData name="Huong Nguyen" userId="a3438fb82b5343a2" providerId="LiveId" clId="{F83FA522-6960-4F44-B8AD-BF6FA669975D}" dt="2018-09-29T04:34:01.384" v="117"/>
+          <ac:spMkLst>
+            <pc:docMk/>
+            <pc:sldMk cId="3864306079" sldId="307"/>
+            <ac:spMk id="5" creationId="{861E70C1-9ABD-4381-BD3C-35DE836572FE}"/>
+          </ac:spMkLst>
+        </pc:spChg>
+        <pc:spChg chg="mod">
+          <ac:chgData name="Huong Nguyen" userId="a3438fb82b5343a2" providerId="LiveId" clId="{F83FA522-6960-4F44-B8AD-BF6FA669975D}" dt="2018-09-29T04:41:13.900" v="262" actId="1076"/>
+          <ac:spMkLst>
+            <pc:docMk/>
+            <pc:sldMk cId="3864306079" sldId="307"/>
+            <ac:spMk id="12" creationId="{086FF746-9FDE-4911-A7A2-684693667CA8}"/>
+          </ac:spMkLst>
+        </pc:spChg>
+        <pc:spChg chg="mod">
+          <ac:chgData name="Huong Nguyen" userId="a3438fb82b5343a2" providerId="LiveId" clId="{F83FA522-6960-4F44-B8AD-BF6FA669975D}" dt="2018-09-29T04:40:40.347" v="256" actId="1038"/>
+          <ac:spMkLst>
+            <pc:docMk/>
+            <pc:sldMk cId="3864306079" sldId="307"/>
+            <ac:spMk id="13" creationId="{7E38B547-1D72-4CB6-A4A0-3B458D14BB7E}"/>
+          </ac:spMkLst>
+        </pc:spChg>
+        <pc:spChg chg="mod">
+          <ac:chgData name="Huong Nguyen" userId="a3438fb82b5343a2" providerId="LiveId" clId="{F83FA522-6960-4F44-B8AD-BF6FA669975D}" dt="2018-09-29T04:40:51.560" v="257" actId="1076"/>
+          <ac:spMkLst>
+            <pc:docMk/>
+            <pc:sldMk cId="3864306079" sldId="307"/>
+            <ac:spMk id="14" creationId="{989F4FD8-4D18-409D-9E98-A1D36FD09E96}"/>
+          </ac:spMkLst>
+        </pc:spChg>
+        <pc:spChg chg="add del mod">
+          <ac:chgData name="Huong Nguyen" userId="a3438fb82b5343a2" providerId="LiveId" clId="{F83FA522-6960-4F44-B8AD-BF6FA669975D}" dt="2018-09-29T04:34:08.102" v="122"/>
+          <ac:spMkLst>
+            <pc:docMk/>
+            <pc:sldMk cId="3864306079" sldId="307"/>
+            <ac:spMk id="15" creationId="{9DB02133-0434-4069-A06D-BFD6E257D4BE}"/>
+          </ac:spMkLst>
+        </pc:spChg>
+        <pc:spChg chg="add del">
+          <ac:chgData name="Huong Nguyen" userId="a3438fb82b5343a2" providerId="LiveId" clId="{F83FA522-6960-4F44-B8AD-BF6FA669975D}" dt="2018-09-29T04:34:17.882" v="124"/>
+          <ac:spMkLst>
+            <pc:docMk/>
+            <pc:sldMk cId="3864306079" sldId="307"/>
+            <ac:spMk id="17" creationId="{7B4D1D5F-7ACD-4CA2-91E5-9E5D2718EEB2}"/>
+          </ac:spMkLst>
+        </pc:spChg>
+        <pc:spChg chg="add del mod">
+          <ac:chgData name="Huong Nguyen" userId="a3438fb82b5343a2" providerId="LiveId" clId="{F83FA522-6960-4F44-B8AD-BF6FA669975D}" dt="2018-09-29T04:34:23.043" v="128"/>
+          <ac:spMkLst>
+            <pc:docMk/>
+            <pc:sldMk cId="3864306079" sldId="307"/>
+            <ac:spMk id="19" creationId="{42568573-F521-4EF2-BD4E-2CC29B8B5E50}"/>
+          </ac:spMkLst>
+        </pc:spChg>
+        <pc:spChg chg="add mod">
+          <ac:chgData name="Huong Nguyen" userId="a3438fb82b5343a2" providerId="LiveId" clId="{F83FA522-6960-4F44-B8AD-BF6FA669975D}" dt="2018-09-29T04:41:21.324" v="264" actId="1076"/>
+          <ac:spMkLst>
+            <pc:docMk/>
+            <pc:sldMk cId="3864306079" sldId="307"/>
+            <ac:spMk id="22" creationId="{0C966AE4-EE3F-498D-8C44-4149D9D66BF9}"/>
+          </ac:spMkLst>
+        </pc:spChg>
+        <pc:spChg chg="add mod">
+          <ac:chgData name="Huong Nguyen" userId="a3438fb82b5343a2" providerId="LiveId" clId="{F83FA522-6960-4F44-B8AD-BF6FA669975D}" dt="2018-09-29T04:42:26.659" v="373" actId="20577"/>
+          <ac:spMkLst>
+            <pc:docMk/>
+            <pc:sldMk cId="3864306079" sldId="307"/>
+            <ac:spMk id="23" creationId="{7C4EEF5E-21F0-40AF-B067-90FFA4BD37C0}"/>
+          </ac:spMkLst>
+        </pc:spChg>
+        <pc:picChg chg="add mod">
+          <ac:chgData name="Huong Nguyen" userId="a3438fb82b5343a2" providerId="LiveId" clId="{F83FA522-6960-4F44-B8AD-BF6FA669975D}" dt="2018-09-29T04:41:43.451" v="268" actId="1076"/>
+          <ac:picMkLst>
+            <pc:docMk/>
+            <pc:sldMk cId="3864306079" sldId="307"/>
+            <ac:picMk id="6" creationId="{1D569374-5F59-4529-AC39-4BD4C9FADCE5}"/>
+          </ac:picMkLst>
+        </pc:picChg>
+        <pc:picChg chg="add del mod">
+          <ac:chgData name="Huong Nguyen" userId="a3438fb82b5343a2" providerId="LiveId" clId="{F83FA522-6960-4F44-B8AD-BF6FA669975D}" dt="2018-09-29T04:34:08.102" v="122"/>
+          <ac:picMkLst>
+            <pc:docMk/>
+            <pc:sldMk cId="3864306079" sldId="307"/>
+            <ac:picMk id="16" creationId="{2503D6A1-D9CA-49E0-9FFE-100688DDF386}"/>
+          </ac:picMkLst>
+        </pc:picChg>
+        <pc:picChg chg="add del">
+          <ac:chgData name="Huong Nguyen" userId="a3438fb82b5343a2" providerId="LiveId" clId="{F83FA522-6960-4F44-B8AD-BF6FA669975D}" dt="2018-09-29T04:34:17.882" v="124"/>
+          <ac:picMkLst>
+            <pc:docMk/>
+            <pc:sldMk cId="3864306079" sldId="307"/>
+            <ac:picMk id="18" creationId="{F35D980D-8DFC-4D71-90BC-4A3A3FC278EA}"/>
+          </ac:picMkLst>
+        </pc:picChg>
+        <pc:picChg chg="add del mod">
+          <ac:chgData name="Huong Nguyen" userId="a3438fb82b5343a2" providerId="LiveId" clId="{F83FA522-6960-4F44-B8AD-BF6FA669975D}" dt="2018-09-29T04:34:23.043" v="128"/>
+          <ac:picMkLst>
+            <pc:docMk/>
+            <pc:sldMk cId="3864306079" sldId="307"/>
+            <ac:picMk id="20" creationId="{BB0B8E9A-DE1E-4509-BCD1-011412479355}"/>
+          </ac:picMkLst>
+        </pc:picChg>
+        <pc:picChg chg="add mod">
+          <ac:chgData name="Huong Nguyen" userId="a3438fb82b5343a2" providerId="LiveId" clId="{F83FA522-6960-4F44-B8AD-BF6FA669975D}" dt="2018-09-29T04:41:17.315" v="263" actId="1076"/>
+          <ac:picMkLst>
+            <pc:docMk/>
+            <pc:sldMk cId="3864306079" sldId="307"/>
+            <ac:picMk id="21" creationId="{6C0ABF31-848A-4AF4-9839-08ADCB3A7029}"/>
+          </ac:picMkLst>
+        </pc:picChg>
+        <pc:picChg chg="add del mod">
+          <ac:chgData name="Huong Nguyen" userId="a3438fb82b5343a2" providerId="LiveId" clId="{F83FA522-6960-4F44-B8AD-BF6FA669975D}" dt="2018-09-29T04:34:02.025" v="118"/>
+          <ac:picMkLst>
+            <pc:docMk/>
+            <pc:sldMk cId="3864306079" sldId="307"/>
+            <ac:picMk id="1026" creationId="{E6ED50DA-4F65-41C8-B943-EB2522ABEE2B}"/>
+          </ac:picMkLst>
+        </pc:picChg>
+        <pc:picChg chg="mod">
+          <ac:chgData name="Huong Nguyen" userId="a3438fb82b5343a2" providerId="LiveId" clId="{F83FA522-6960-4F44-B8AD-BF6FA669975D}" dt="2018-09-29T04:40:40.347" v="256" actId="1038"/>
+          <ac:picMkLst>
+            <pc:docMk/>
+            <pc:sldMk cId="3864306079" sldId="307"/>
+            <ac:picMk id="1028" creationId="{8EAC0F6F-E3F3-4417-8A40-269BFA2A77CE}"/>
+          </ac:picMkLst>
+        </pc:picChg>
+        <pc:picChg chg="mod">
+          <ac:chgData name="Huong Nguyen" userId="a3438fb82b5343a2" providerId="LiveId" clId="{F83FA522-6960-4F44-B8AD-BF6FA669975D}" dt="2018-09-29T04:41:06.340" v="260" actId="1076"/>
+          <ac:picMkLst>
+            <pc:docMk/>
+            <pc:sldMk cId="3864306079" sldId="307"/>
+            <ac:picMk id="1032" creationId="{58817015-E4EF-4791-A593-9EFB5A372EB5}"/>
+          </ac:picMkLst>
+        </pc:picChg>
+        <pc:picChg chg="mod">
+          <ac:chgData name="Huong Nguyen" userId="a3438fb82b5343a2" providerId="LiveId" clId="{F83FA522-6960-4F44-B8AD-BF6FA669975D}" dt="2018-09-29T04:40:40.347" v="256" actId="1038"/>
+          <ac:picMkLst>
+            <pc:docMk/>
+            <pc:sldMk cId="3864306079" sldId="307"/>
+            <ac:picMk id="1034" creationId="{44B01E73-8AE3-4E87-B6D1-03068C9B8FAD}"/>
+          </ac:picMkLst>
+        </pc:picChg>
+        <pc:picChg chg="mod">
+          <ac:chgData name="Huong Nguyen" userId="a3438fb82b5343a2" providerId="LiveId" clId="{F83FA522-6960-4F44-B8AD-BF6FA669975D}" dt="2018-09-29T04:41:03.847" v="259" actId="1076"/>
+          <ac:picMkLst>
+            <pc:docMk/>
+            <pc:sldMk cId="3864306079" sldId="307"/>
+            <ac:picMk id="1038" creationId="{E1C802EF-9783-4B05-A419-298685553B02}"/>
+          </ac:picMkLst>
+        </pc:picChg>
+      </pc:sldChg>
+      <pc:sldChg chg="addSp delSp modSp">
+        <pc:chgData name="Huong Nguyen" userId="a3438fb82b5343a2" providerId="LiveId" clId="{F83FA522-6960-4F44-B8AD-BF6FA669975D}" dt="2018-09-29T04:34:59.666" v="137"/>
+        <pc:sldMkLst>
+          <pc:docMk/>
+          <pc:sldMk cId="116559371" sldId="308"/>
+        </pc:sldMkLst>
+        <pc:spChg chg="del">
+          <ac:chgData name="Huong Nguyen" userId="a3438fb82b5343a2" providerId="LiveId" clId="{F83FA522-6960-4F44-B8AD-BF6FA669975D}" dt="2018-09-29T04:34:35.300" v="131" actId="478"/>
+          <ac:spMkLst>
+            <pc:docMk/>
+            <pc:sldMk cId="116559371" sldId="308"/>
+            <ac:spMk id="3" creationId="{97C6676D-D7B3-4F7D-879A-CE8D360FE820}"/>
+          </ac:spMkLst>
+        </pc:spChg>
+        <pc:spChg chg="add del">
+          <ac:chgData name="Huong Nguyen" userId="a3438fb82b5343a2" providerId="LiveId" clId="{F83FA522-6960-4F44-B8AD-BF6FA669975D}" dt="2018-09-29T04:34:29.645" v="130"/>
+          <ac:spMkLst>
+            <pc:docMk/>
+            <pc:sldMk cId="116559371" sldId="308"/>
+            <ac:spMk id="4" creationId="{555B0808-5E41-43AA-BA08-FE46AFBB085C}"/>
+          </ac:spMkLst>
+        </pc:spChg>
+        <pc:spChg chg="add del">
+          <ac:chgData name="Huong Nguyen" userId="a3438fb82b5343a2" providerId="LiveId" clId="{F83FA522-6960-4F44-B8AD-BF6FA669975D}" dt="2018-09-29T04:34:37.906" v="133"/>
+          <ac:spMkLst>
+            <pc:docMk/>
+            <pc:sldMk cId="116559371" sldId="308"/>
+            <ac:spMk id="6" creationId="{F21BFF29-C82F-4895-8A1A-3C06844918AB}"/>
+          </ac:spMkLst>
+        </pc:spChg>
+        <pc:picChg chg="add del">
+          <ac:chgData name="Huong Nguyen" userId="a3438fb82b5343a2" providerId="LiveId" clId="{F83FA522-6960-4F44-B8AD-BF6FA669975D}" dt="2018-09-29T04:34:29.645" v="130"/>
+          <ac:picMkLst>
+            <pc:docMk/>
+            <pc:sldMk cId="116559371" sldId="308"/>
+            <ac:picMk id="5" creationId="{D9915C77-B108-433F-B26A-0ED9A24316A4}"/>
+          </ac:picMkLst>
+        </pc:picChg>
+        <pc:picChg chg="add del">
+          <ac:chgData name="Huong Nguyen" userId="a3438fb82b5343a2" providerId="LiveId" clId="{F83FA522-6960-4F44-B8AD-BF6FA669975D}" dt="2018-09-29T04:34:37.906" v="133"/>
+          <ac:picMkLst>
+            <pc:docMk/>
+            <pc:sldMk cId="116559371" sldId="308"/>
+            <ac:picMk id="7" creationId="{C92344D3-3AE1-4809-8648-AD7E344FB072}"/>
+          </ac:picMkLst>
+        </pc:picChg>
+        <pc:picChg chg="add del mod">
+          <ac:chgData name="Huong Nguyen" userId="a3438fb82b5343a2" providerId="LiveId" clId="{F83FA522-6960-4F44-B8AD-BF6FA669975D}" dt="2018-09-29T04:34:59.666" v="137"/>
+          <ac:picMkLst>
+            <pc:docMk/>
+            <pc:sldMk cId="116559371" sldId="308"/>
+            <ac:picMk id="2050" creationId="{655CFB8B-DC07-4035-A124-6E3D67A5D781}"/>
+          </ac:picMkLst>
+        </pc:picChg>
       </pc:sldChg>
       <pc:sldChg chg="addSp modSp modAnim">
         <pc:chgData name="Huong Nguyen" userId="a3438fb82b5343a2" providerId="LiveId" clId="{F83FA522-6960-4F44-B8AD-BF6FA669975D}" dt="2018-09-18T16:56:10.472" v="111"/>
@@ -270,7 +556,7 @@
           <a:p>
             <a:fld id="{7C73E1C4-0E57-49E6-A5B1-CF2F2E9F2E1A}" type="datetimeFigureOut">
               <a:rPr lang="en-US" smtClean="0"/>
-              <a:t>09/18/2018</a:t>
+              <a:t>09/29/2018</a:t>
             </a:fld>
             <a:endParaRPr lang="en-US"/>
           </a:p>
@@ -1276,7 +1562,7 @@
           <a:p>
             <a:fld id="{F1C761E4-4213-4FD4-9B54-B60716A2CCD2}" type="datetimeFigureOut">
               <a:rPr lang="en-US" smtClean="0"/>
-              <a:t>09/18/2018</a:t>
+              <a:t>09/29/2018</a:t>
             </a:fld>
             <a:endParaRPr lang="en-US"/>
           </a:p>
@@ -1476,7 +1762,7 @@
           <a:p>
             <a:fld id="{F1C761E4-4213-4FD4-9B54-B60716A2CCD2}" type="datetimeFigureOut">
               <a:rPr lang="en-US" smtClean="0"/>
-              <a:t>09/18/2018</a:t>
+              <a:t>09/29/2018</a:t>
             </a:fld>
             <a:endParaRPr lang="en-US"/>
           </a:p>
@@ -1686,7 +1972,7 @@
           <a:p>
             <a:fld id="{F1C761E4-4213-4FD4-9B54-B60716A2CCD2}" type="datetimeFigureOut">
               <a:rPr lang="en-US" smtClean="0"/>
-              <a:t>09/18/2018</a:t>
+              <a:t>09/29/2018</a:t>
             </a:fld>
             <a:endParaRPr lang="en-US"/>
           </a:p>
@@ -2118,7 +2404,7 @@
           <a:p>
             <a:fld id="{F1C761E4-4213-4FD4-9B54-B60716A2CCD2}" type="datetimeFigureOut">
               <a:rPr lang="en-US" smtClean="0"/>
-              <a:t>09/18/2018</a:t>
+              <a:t>09/29/2018</a:t>
             </a:fld>
             <a:endParaRPr lang="en-US"/>
           </a:p>
@@ -2394,7 +2680,7 @@
           <a:p>
             <a:fld id="{F1C761E4-4213-4FD4-9B54-B60716A2CCD2}" type="datetimeFigureOut">
               <a:rPr lang="en-US" smtClean="0"/>
-              <a:t>09/18/2018</a:t>
+              <a:t>09/29/2018</a:t>
             </a:fld>
             <a:endParaRPr lang="en-US"/>
           </a:p>
@@ -2662,7 +2948,7 @@
           <a:p>
             <a:fld id="{F1C761E4-4213-4FD4-9B54-B60716A2CCD2}" type="datetimeFigureOut">
               <a:rPr lang="en-US" smtClean="0"/>
-              <a:t>09/18/2018</a:t>
+              <a:t>09/29/2018</a:t>
             </a:fld>
             <a:endParaRPr lang="en-US"/>
           </a:p>
@@ -3077,7 +3363,7 @@
           <a:p>
             <a:fld id="{F1C761E4-4213-4FD4-9B54-B60716A2CCD2}" type="datetimeFigureOut">
               <a:rPr lang="en-US" smtClean="0"/>
-              <a:t>09/18/2018</a:t>
+              <a:t>09/29/2018</a:t>
             </a:fld>
             <a:endParaRPr lang="en-US"/>
           </a:p>
@@ -3219,7 +3505,7 @@
           <a:p>
             <a:fld id="{F1C761E4-4213-4FD4-9B54-B60716A2CCD2}" type="datetimeFigureOut">
               <a:rPr lang="en-US" smtClean="0"/>
-              <a:t>09/18/2018</a:t>
+              <a:t>09/29/2018</a:t>
             </a:fld>
             <a:endParaRPr lang="en-US"/>
           </a:p>
@@ -3332,7 +3618,7 @@
           <a:p>
             <a:fld id="{F1C761E4-4213-4FD4-9B54-B60716A2CCD2}" type="datetimeFigureOut">
               <a:rPr lang="en-US" smtClean="0"/>
-              <a:t>09/18/2018</a:t>
+              <a:t>09/29/2018</a:t>
             </a:fld>
             <a:endParaRPr lang="en-US"/>
           </a:p>
@@ -3645,7 +3931,7 @@
           <a:p>
             <a:fld id="{F1C761E4-4213-4FD4-9B54-B60716A2CCD2}" type="datetimeFigureOut">
               <a:rPr lang="en-US" smtClean="0"/>
-              <a:t>09/18/2018</a:t>
+              <a:t>09/29/2018</a:t>
             </a:fld>
             <a:endParaRPr lang="en-US"/>
           </a:p>
@@ -3934,7 +4220,7 @@
           <a:p>
             <a:fld id="{F1C761E4-4213-4FD4-9B54-B60716A2CCD2}" type="datetimeFigureOut">
               <a:rPr lang="en-US" smtClean="0"/>
-              <a:t>09/18/2018</a:t>
+              <a:t>09/29/2018</a:t>
             </a:fld>
             <a:endParaRPr lang="en-US"/>
           </a:p>
@@ -4177,7 +4463,7 @@
           <a:p>
             <a:fld id="{F1C761E4-4213-4FD4-9B54-B60716A2CCD2}" type="datetimeFigureOut">
               <a:rPr lang="en-US" smtClean="0"/>
-              <a:t>09/18/2018</a:t>
+              <a:t>09/29/2018</a:t>
             </a:fld>
             <a:endParaRPr lang="en-US"/>
           </a:p>
@@ -4922,10 +5208,62 @@
               <a:rPr lang="en-US" dirty="0" err="1"/>
               <a:t>trở</a:t>
             </a:r>
-            <a:endParaRPr lang="en-US" dirty="0"/>
-          </a:p>
-          <a:p>
-            <a:endParaRPr lang="en-US" dirty="0"/>
+            <a:r>
+              <a:rPr lang="en-US" dirty="0"/>
+              <a:t> (1k)</a:t>
+            </a:r>
+          </a:p>
+          <a:p>
+            <a:r>
+              <a:rPr lang="en-US" dirty="0"/>
+              <a:t>1 Module relay 1 </a:t>
+            </a:r>
+            <a:r>
+              <a:rPr lang="en-US" dirty="0" err="1"/>
+              <a:t>kênh</a:t>
+            </a:r>
+            <a:r>
+              <a:rPr lang="en-US" dirty="0"/>
+              <a:t> 5v</a:t>
+            </a:r>
+          </a:p>
+          <a:p>
+            <a:r>
+              <a:rPr lang="en-US" dirty="0"/>
+              <a:t>1 </a:t>
+            </a:r>
+            <a:r>
+              <a:rPr lang="en-US" dirty="0" err="1"/>
+              <a:t>Bóng</a:t>
+            </a:r>
+            <a:r>
+              <a:rPr lang="en-US" dirty="0"/>
+              <a:t> </a:t>
+            </a:r>
+            <a:r>
+              <a:rPr lang="en-US" dirty="0" err="1"/>
+              <a:t>đèn</a:t>
+            </a:r>
+            <a:r>
+              <a:rPr lang="en-US" dirty="0"/>
+              <a:t> (</a:t>
+            </a:r>
+            <a:r>
+              <a:rPr lang="en-US" dirty="0" err="1"/>
+              <a:t>có</a:t>
+            </a:r>
+            <a:r>
+              <a:rPr lang="en-US" dirty="0"/>
+              <a:t> </a:t>
+            </a:r>
+            <a:r>
+              <a:rPr lang="en-US" dirty="0" err="1"/>
+              <a:t>đui</a:t>
+            </a:r>
+            <a:r>
+              <a:rPr lang="en-US" dirty="0"/>
+              <a:t>)</a:t>
+            </a:r>
           </a:p>
         </p:txBody>
       </p:sp>
@@ -4958,7 +5296,7 @@
         </p:blipFill>
         <p:spPr bwMode="auto">
           <a:xfrm>
-            <a:off x="9366614" y="4421767"/>
+            <a:off x="10391188" y="4421767"/>
             <a:ext cx="1123391" cy="1123391"/>
           </a:xfrm>
           <a:prstGeom prst="rect">
@@ -5005,7 +5343,7 @@
         </p:blipFill>
         <p:spPr bwMode="auto">
           <a:xfrm>
-            <a:off x="6701480" y="2173283"/>
+            <a:off x="8078813" y="2126367"/>
             <a:ext cx="1626973" cy="1626973"/>
           </a:xfrm>
           <a:prstGeom prst="rect">
@@ -5052,7 +5390,7 @@
         </p:blipFill>
         <p:spPr bwMode="auto">
           <a:xfrm>
-            <a:off x="8502820" y="1651727"/>
+            <a:off x="9527394" y="1651727"/>
             <a:ext cx="2850980" cy="2138235"/>
           </a:xfrm>
           <a:prstGeom prst="rect">
@@ -5099,7 +5437,7 @@
         </p:blipFill>
         <p:spPr bwMode="auto">
           <a:xfrm>
-            <a:off x="6911158" y="4338851"/>
+            <a:off x="8469204" y="4354574"/>
             <a:ext cx="1289222" cy="1289222"/>
           </a:xfrm>
           <a:prstGeom prst="rect">
@@ -5131,7 +5469,7 @@
         </p:nvSpPr>
         <p:spPr>
           <a:xfrm>
-            <a:off x="6313355" y="3584464"/>
+            <a:off x="7791896" y="3570027"/>
             <a:ext cx="2403222" cy="369332"/>
           </a:xfrm>
           <a:prstGeom prst="rect">
@@ -5174,7 +5512,7 @@
         </p:nvSpPr>
         <p:spPr>
           <a:xfrm>
-            <a:off x="7021080" y="5643796"/>
+            <a:off x="8658427" y="5594067"/>
             <a:ext cx="987771" cy="369332"/>
           </a:xfrm>
           <a:prstGeom prst="rect">
@@ -5218,7 +5556,7 @@
         </p:nvSpPr>
         <p:spPr>
           <a:xfrm>
-            <a:off x="9646198" y="5661260"/>
+            <a:off x="10670772" y="5661260"/>
             <a:ext cx="979755" cy="369332"/>
           </a:xfrm>
           <a:prstGeom prst="rect">
@@ -5257,7 +5595,7 @@
         </p:nvSpPr>
         <p:spPr>
           <a:xfrm>
-            <a:off x="9672101" y="3605296"/>
+            <a:off x="10684450" y="3624927"/>
             <a:ext cx="715260" cy="369332"/>
           </a:xfrm>
           <a:prstGeom prst="rect">
@@ -5275,6 +5613,183 @@
               <a:rPr lang="en-US" b="1" dirty="0"/>
               <a:t>Alexa</a:t>
             </a:r>
+          </a:p>
+        </p:txBody>
+      </p:sp>
+      <p:pic>
+        <p:nvPicPr>
+          <p:cNvPr id="21" name="Picture 2" descr="https://linhkienmidv.com/wp-content/uploads/2018/08/TB2qrGNtpXXXXXxXXXXXXXXXXXX_361121710.jpg">
+            <a:extLst>
+              <a:ext uri="{FF2B5EF4-FFF2-40B4-BE49-F238E27FC236}">
+                <a16:creationId xmlns:a16="http://schemas.microsoft.com/office/drawing/2014/main" id="{6C0ABF31-848A-4AF4-9839-08ADCB3A7029}"/>
+              </a:ext>
+            </a:extLst>
+          </p:cNvPr>
+          <p:cNvPicPr>
+            <a:picLocks noChangeAspect="1" noChangeArrowheads="1"/>
+          </p:cNvPicPr>
+          <p:nvPr/>
+        </p:nvPicPr>
+        <p:blipFill>
+          <a:blip r:embed="rId7">
+            <a:extLst>
+              <a:ext uri="{28A0092B-C50C-407E-A947-70E740481C1C}">
+                <a14:useLocalDpi xmlns:a14="http://schemas.microsoft.com/office/drawing/2010/main" val="0"/>
+              </a:ext>
+            </a:extLst>
+          </a:blip>
+          <a:srcRect/>
+          <a:stretch>
+            <a:fillRect/>
+          </a:stretch>
+        </p:blipFill>
+        <p:spPr bwMode="auto">
+          <a:xfrm>
+            <a:off x="6279423" y="4219741"/>
+            <a:ext cx="1554917" cy="1558887"/>
+          </a:xfrm>
+          <a:prstGeom prst="rect">
+            <a:avLst/>
+          </a:prstGeom>
+          <a:noFill/>
+          <a:extLst>
+            <a:ext uri="{909E8E84-426E-40DD-AFC4-6F175D3DCCD1}">
+              <a14:hiddenFill xmlns:a14="http://schemas.microsoft.com/office/drawing/2010/main">
+                <a:solidFill>
+                  <a:srgbClr val="FFFFFF"/>
+                </a:solidFill>
+              </a14:hiddenFill>
+            </a:ext>
+          </a:extLst>
+        </p:spPr>
+      </p:pic>
+      <p:sp>
+        <p:nvSpPr>
+          <p:cNvPr id="22" name="Hộp Văn bản 21">
+            <a:extLst>
+              <a:ext uri="{FF2B5EF4-FFF2-40B4-BE49-F238E27FC236}">
+                <a16:creationId xmlns:a16="http://schemas.microsoft.com/office/drawing/2014/main" id="{0C966AE4-EE3F-498D-8C44-4149D9D66BF9}"/>
+              </a:ext>
+            </a:extLst>
+          </p:cNvPr>
+          <p:cNvSpPr txBox="1"/>
+          <p:nvPr/>
+        </p:nvSpPr>
+        <p:spPr>
+          <a:xfrm>
+            <a:off x="6562896" y="5635939"/>
+            <a:ext cx="1297150" cy="369332"/>
+          </a:xfrm>
+          <a:prstGeom prst="rect">
+            <a:avLst/>
+          </a:prstGeom>
+          <a:noFill/>
+        </p:spPr>
+        <p:txBody>
+          <a:bodyPr wrap="none" rtlCol="0">
+            <a:spAutoFit/>
+          </a:bodyPr>
+          <a:lstStyle/>
+          <a:p>
+            <a:r>
+              <a:rPr lang="en-US" b="1" dirty="0" err="1"/>
+              <a:t>Mạch</a:t>
+            </a:r>
+            <a:r>
+              <a:rPr lang="en-US" b="1" dirty="0"/>
+              <a:t> Relay</a:t>
+            </a:r>
+          </a:p>
+        </p:txBody>
+      </p:sp>
+      <p:pic>
+        <p:nvPicPr>
+          <p:cNvPr id="6" name="Picture 4" descr="Káº¿t quáº£ hÃ¬nh áº£nh cho bÃ³ng ÄÃ¨n">
+            <a:extLst>
+              <a:ext uri="{FF2B5EF4-FFF2-40B4-BE49-F238E27FC236}">
+                <a16:creationId xmlns:a16="http://schemas.microsoft.com/office/drawing/2014/main" id="{1D569374-5F59-4529-AC39-4BD4C9FADCE5}"/>
+              </a:ext>
+            </a:extLst>
+          </p:cNvPr>
+          <p:cNvPicPr>
+            <a:picLocks noChangeAspect="1" noChangeArrowheads="1"/>
+          </p:cNvPicPr>
+          <p:nvPr/>
+        </p:nvPicPr>
+        <p:blipFill>
+          <a:blip r:embed="rId8">
+            <a:extLst>
+              <a:ext uri="{28A0092B-C50C-407E-A947-70E740481C1C}">
+                <a14:useLocalDpi xmlns:a14="http://schemas.microsoft.com/office/drawing/2010/main" val="0"/>
+              </a:ext>
+            </a:extLst>
+          </a:blip>
+          <a:srcRect/>
+          <a:stretch>
+            <a:fillRect/>
+          </a:stretch>
+        </p:blipFill>
+        <p:spPr bwMode="auto">
+          <a:xfrm>
+            <a:off x="4496812" y="4446320"/>
+            <a:ext cx="1147747" cy="1147747"/>
+          </a:xfrm>
+          <a:prstGeom prst="rect">
+            <a:avLst/>
+          </a:prstGeom>
+          <a:noFill/>
+          <a:extLst>
+            <a:ext uri="{909E8E84-426E-40DD-AFC4-6F175D3DCCD1}">
+              <a14:hiddenFill xmlns:a14="http://schemas.microsoft.com/office/drawing/2010/main">
+                <a:solidFill>
+                  <a:srgbClr val="FFFFFF"/>
+                </a:solidFill>
+              </a14:hiddenFill>
+            </a:ext>
+          </a:extLst>
+        </p:spPr>
+      </p:pic>
+      <p:sp>
+        <p:nvSpPr>
+          <p:cNvPr id="23" name="Hộp Văn bản 22">
+            <a:extLst>
+              <a:ext uri="{FF2B5EF4-FFF2-40B4-BE49-F238E27FC236}">
+                <a16:creationId xmlns:a16="http://schemas.microsoft.com/office/drawing/2014/main" id="{7C4EEF5E-21F0-40AF-B067-90FFA4BD37C0}"/>
+              </a:ext>
+            </a:extLst>
+          </p:cNvPr>
+          <p:cNvSpPr txBox="1"/>
+          <p:nvPr/>
+        </p:nvSpPr>
+        <p:spPr>
+          <a:xfrm>
+            <a:off x="4532223" y="5635939"/>
+            <a:ext cx="1093569" cy="369332"/>
+          </a:xfrm>
+          <a:prstGeom prst="rect">
+            <a:avLst/>
+          </a:prstGeom>
+          <a:noFill/>
+        </p:spPr>
+        <p:txBody>
+          <a:bodyPr wrap="none" rtlCol="0">
+            <a:spAutoFit/>
+          </a:bodyPr>
+          <a:lstStyle/>
+          <a:p>
+            <a:r>
+              <a:rPr lang="en-US" b="1" dirty="0" err="1"/>
+              <a:t>Bóng</a:t>
+            </a:r>
+            <a:r>
+              <a:rPr lang="en-US" b="1" dirty="0"/>
+              <a:t> </a:t>
+            </a:r>
+            <a:r>
+              <a:rPr lang="en-US" b="1" dirty="0" err="1"/>
+              <a:t>đèn</a:t>
+            </a:r>
+            <a:endParaRPr lang="en-US" b="1" dirty="0"/>
           </a:p>
         </p:txBody>
       </p:sp>
@@ -5318,7 +5833,12 @@
             <p:ph type="title"/>
           </p:nvPr>
         </p:nvSpPr>
-        <p:spPr/>
+        <p:spPr>
+          <a:xfrm>
+            <a:off x="838200" y="365125"/>
+            <a:ext cx="10515600" cy="1325563"/>
+          </a:xfrm>
+        </p:spPr>
         <p:txBody>
           <a:bodyPr/>
           <a:lstStyle/>
@@ -5407,12 +5927,218 @@
         </p:blipFill>
         <p:spPr>
           <a:xfrm>
-            <a:off x="4612511" y="1880444"/>
-            <a:ext cx="2966977" cy="4104996"/>
+            <a:off x="3357969" y="1690688"/>
+            <a:ext cx="3377059" cy="4672370"/>
           </a:xfrm>
           <a:prstGeom prst="rect">
             <a:avLst/>
           </a:prstGeom>
+        </p:spPr>
+      </p:pic>
+      <p:sp>
+        <p:nvSpPr>
+          <p:cNvPr id="4" name="Hộp Văn bản 3">
+            <a:extLst>
+              <a:ext uri="{FF2B5EF4-FFF2-40B4-BE49-F238E27FC236}">
+                <a16:creationId xmlns:a16="http://schemas.microsoft.com/office/drawing/2014/main" id="{4E687418-25DB-458D-9A61-E769E4A9557F}"/>
+              </a:ext>
+            </a:extLst>
+          </p:cNvPr>
+          <p:cNvSpPr txBox="1"/>
+          <p:nvPr/>
+        </p:nvSpPr>
+        <p:spPr>
+          <a:xfrm>
+            <a:off x="6886252" y="2988869"/>
+            <a:ext cx="958917" cy="369332"/>
+          </a:xfrm>
+          <a:prstGeom prst="rect">
+            <a:avLst/>
+          </a:prstGeom>
+          <a:noFill/>
+        </p:spPr>
+        <p:txBody>
+          <a:bodyPr wrap="none" rtlCol="0">
+            <a:spAutoFit/>
+          </a:bodyPr>
+          <a:lstStyle/>
+          <a:p>
+            <a:r>
+              <a:rPr lang="en-US" b="1" dirty="0"/>
+              <a:t>GPIO 10</a:t>
+            </a:r>
+          </a:p>
+        </p:txBody>
+      </p:sp>
+      <p:cxnSp>
+        <p:nvCxnSpPr>
+          <p:cNvPr id="5" name="Đường kết nối Mũi tên Thẳng 4">
+            <a:extLst>
+              <a:ext uri="{FF2B5EF4-FFF2-40B4-BE49-F238E27FC236}">
+                <a16:creationId xmlns:a16="http://schemas.microsoft.com/office/drawing/2014/main" id="{1B2780DB-AAEC-49F7-9BCB-947370F1D6B2}"/>
+              </a:ext>
+            </a:extLst>
+          </p:cNvPr>
+          <p:cNvCxnSpPr>
+            <a:cxnSpLocks/>
+          </p:cNvCxnSpPr>
+          <p:nvPr/>
+        </p:nvCxnSpPr>
+        <p:spPr>
+          <a:xfrm flipH="1">
+            <a:off x="5600700" y="3324865"/>
+            <a:ext cx="1285553" cy="608076"/>
+          </a:xfrm>
+          <a:prstGeom prst="straightConnector1">
+            <a:avLst/>
+          </a:prstGeom>
+          <a:ln w="19050">
+            <a:solidFill>
+              <a:srgbClr val="FF0000"/>
+            </a:solidFill>
+            <a:tailEnd type="triangle"/>
+          </a:ln>
+        </p:spPr>
+        <p:style>
+          <a:lnRef idx="1">
+            <a:schemeClr val="accent1"/>
+          </a:lnRef>
+          <a:fillRef idx="0">
+            <a:schemeClr val="accent1"/>
+          </a:fillRef>
+          <a:effectRef idx="0">
+            <a:schemeClr val="accent1"/>
+          </a:effectRef>
+          <a:fontRef idx="minor">
+            <a:schemeClr val="tx1"/>
+          </a:fontRef>
+        </p:style>
+      </p:cxnSp>
+      <p:sp>
+        <p:nvSpPr>
+          <p:cNvPr id="8" name="Hộp Văn bản 7">
+            <a:extLst>
+              <a:ext uri="{FF2B5EF4-FFF2-40B4-BE49-F238E27FC236}">
+                <a16:creationId xmlns:a16="http://schemas.microsoft.com/office/drawing/2014/main" id="{CECF9CE6-2B3F-4D3E-B9CD-27A874EA299D}"/>
+              </a:ext>
+            </a:extLst>
+          </p:cNvPr>
+          <p:cNvSpPr txBox="1"/>
+          <p:nvPr/>
+        </p:nvSpPr>
+        <p:spPr>
+          <a:xfrm>
+            <a:off x="1677993" y="2804203"/>
+            <a:ext cx="1547603" cy="369332"/>
+          </a:xfrm>
+          <a:prstGeom prst="rect">
+            <a:avLst/>
+          </a:prstGeom>
+          <a:noFill/>
+        </p:spPr>
+        <p:txBody>
+          <a:bodyPr wrap="none" rtlCol="0">
+            <a:spAutoFit/>
+          </a:bodyPr>
+          <a:lstStyle/>
+          <a:p>
+            <a:r>
+              <a:rPr lang="en-US" b="1" dirty="0"/>
+              <a:t>Ground (GND)</a:t>
+            </a:r>
+          </a:p>
+        </p:txBody>
+      </p:sp>
+      <p:cxnSp>
+        <p:nvCxnSpPr>
+          <p:cNvPr id="9" name="Đường kết nối Mũi tên Thẳng 8">
+            <a:extLst>
+              <a:ext uri="{FF2B5EF4-FFF2-40B4-BE49-F238E27FC236}">
+                <a16:creationId xmlns:a16="http://schemas.microsoft.com/office/drawing/2014/main" id="{BBB66E13-FC62-4FC5-B15D-C3CAE305BCC2}"/>
+              </a:ext>
+            </a:extLst>
+          </p:cNvPr>
+          <p:cNvCxnSpPr>
+            <a:cxnSpLocks/>
+            <a:stCxn id="8" idx="2"/>
+          </p:cNvCxnSpPr>
+          <p:nvPr/>
+        </p:nvCxnSpPr>
+        <p:spPr>
+          <a:xfrm>
+            <a:off x="2451795" y="3173535"/>
+            <a:ext cx="2112271" cy="759406"/>
+          </a:xfrm>
+          <a:prstGeom prst="straightConnector1">
+            <a:avLst/>
+          </a:prstGeom>
+          <a:ln w="19050">
+            <a:solidFill>
+              <a:srgbClr val="FF0000"/>
+            </a:solidFill>
+            <a:tailEnd type="triangle"/>
+          </a:ln>
+        </p:spPr>
+        <p:style>
+          <a:lnRef idx="1">
+            <a:schemeClr val="accent1"/>
+          </a:lnRef>
+          <a:fillRef idx="0">
+            <a:schemeClr val="accent1"/>
+          </a:fillRef>
+          <a:effectRef idx="0">
+            <a:schemeClr val="accent1"/>
+          </a:effectRef>
+          <a:fontRef idx="minor">
+            <a:schemeClr val="tx1"/>
+          </a:fontRef>
+        </p:style>
+      </p:cxnSp>
+      <p:pic>
+        <p:nvPicPr>
+          <p:cNvPr id="3074" name="Picture 2" descr="Káº¿t quáº£ hÃ¬nh áº£nh cho led anode cathode">
+            <a:extLst>
+              <a:ext uri="{FF2B5EF4-FFF2-40B4-BE49-F238E27FC236}">
+                <a16:creationId xmlns:a16="http://schemas.microsoft.com/office/drawing/2014/main" id="{A00ABE59-CC75-434A-B72A-6C01AE944180}"/>
+              </a:ext>
+            </a:extLst>
+          </p:cNvPr>
+          <p:cNvPicPr>
+            <a:picLocks noChangeAspect="1" noChangeArrowheads="1"/>
+          </p:cNvPicPr>
+          <p:nvPr/>
+        </p:nvPicPr>
+        <p:blipFill>
+          <a:blip r:embed="rId4">
+            <a:extLst>
+              <a:ext uri="{28A0092B-C50C-407E-A947-70E740481C1C}">
+                <a14:useLocalDpi xmlns:a14="http://schemas.microsoft.com/office/drawing/2010/main" val="0"/>
+              </a:ext>
+            </a:extLst>
+          </a:blip>
+          <a:srcRect/>
+          <a:stretch>
+            <a:fillRect/>
+          </a:stretch>
+        </p:blipFill>
+        <p:spPr bwMode="auto">
+          <a:xfrm>
+            <a:off x="8517828" y="2166374"/>
+            <a:ext cx="1607576" cy="3533135"/>
+          </a:xfrm>
+          <a:prstGeom prst="rect">
+            <a:avLst/>
+          </a:prstGeom>
+          <a:noFill/>
+          <a:extLst>
+            <a:ext uri="{909E8E84-426E-40DD-AFC4-6F175D3DCCD1}">
+              <a14:hiddenFill xmlns:a14="http://schemas.microsoft.com/office/drawing/2010/main">
+                <a:solidFill>
+                  <a:srgbClr val="FFFFFF"/>
+                </a:solidFill>
+              </a14:hiddenFill>
+            </a:ext>
+          </a:extLst>
         </p:spPr>
       </p:pic>
     </p:spTree>
@@ -7264,31 +7990,6 @@
               <a:rPr lang="en-US" dirty="0" err="1"/>
               <a:t>hành</a:t>
             </a:r>
-            <a:endParaRPr lang="en-US" dirty="0"/>
-          </a:p>
-        </p:txBody>
-      </p:sp>
-      <p:sp>
-        <p:nvSpPr>
-          <p:cNvPr id="3" name="Chỗ dành sẵn cho Nội dung 2">
-            <a:extLst>
-              <a:ext uri="{FF2B5EF4-FFF2-40B4-BE49-F238E27FC236}">
-                <a16:creationId xmlns:a16="http://schemas.microsoft.com/office/drawing/2014/main" id="{97C6676D-D7B3-4F7D-879A-CE8D360FE820}"/>
-              </a:ext>
-            </a:extLst>
-          </p:cNvPr>
-          <p:cNvSpPr>
-            <a:spLocks noGrp="1"/>
-          </p:cNvSpPr>
-          <p:nvPr>
-            <p:ph idx="1"/>
-          </p:nvPr>
-        </p:nvSpPr>
-        <p:spPr/>
-        <p:txBody>
-          <a:bodyPr/>
-          <a:lstStyle/>
-          <a:p>
             <a:endParaRPr lang="en-US" dirty="0"/>
           </a:p>
         </p:txBody>

</xml_diff>